<commit_message>
remove inline submit to submit functions
</commit_message>
<xml_diff>
--- a/RCE FRONT END DEMO.pptx
+++ b/RCE FRONT END DEMO.pptx
@@ -10,6 +10,7 @@
     <p:sldId id="258" r:id="rId4"/>
     <p:sldId id="260" r:id="rId5"/>
     <p:sldId id="259" r:id="rId6"/>
+    <p:sldId id="261" r:id="rId7"/>
   </p:sldIdLst>
   <p:sldSz cx="12192000" cy="6858000"/>
   <p:notesSz cx="6858000" cy="9144000"/>
@@ -108,6 +109,11 @@
       </a:defRPr>
     </a:lvl9pPr>
   </p:defaultTextStyle>
+  <p:extLst>
+    <p:ext uri="{EFAFB233-063F-42B5-8137-9DF3F51BA10A}">
+      <p15:sldGuideLst xmlns:p15="http://schemas.microsoft.com/office/powerpoint/2012/main"/>
+    </p:ext>
+  </p:extLst>
 </p:presentation>
 </file>
 
@@ -3795,7 +3801,18 @@
               <a:rPr lang="en-US" dirty="0" err="1"/>
               <a:t>Javascript</a:t>
             </a:r>
-            <a:endParaRPr lang="en-US" dirty="0"/>
+            <a:r>
+              <a:rPr lang="en-US" dirty="0"/>
+              <a:t>. It is </a:t>
+            </a:r>
+            <a:r>
+              <a:rPr lang="en-US" dirty="0" err="1"/>
+              <a:t>Javascript</a:t>
+            </a:r>
+            <a:r>
+              <a:rPr lang="en-US" dirty="0"/>
+              <a:t> plus a type system.</a:t>
+            </a:r>
           </a:p>
           <a:p>
             <a:r>
@@ -4240,6 +4257,119 @@
 </p:sld>
 </file>
 
+<file path=ppt/slides/slide6.xml><?xml version="1.0" encoding="utf-8"?>
+<p:sld xmlns:a="http://schemas.openxmlformats.org/drawingml/2006/main" xmlns:r="http://schemas.openxmlformats.org/officeDocument/2006/relationships" xmlns:p="http://schemas.openxmlformats.org/presentationml/2006/main">
+  <p:cSld>
+    <p:spTree>
+      <p:nvGrpSpPr>
+        <p:cNvPr id="1" name=""/>
+        <p:cNvGrpSpPr/>
+        <p:nvPr/>
+      </p:nvGrpSpPr>
+      <p:grpSpPr>
+        <a:xfrm>
+          <a:off x="0" y="0"/>
+          <a:ext cx="0" cy="0"/>
+          <a:chOff x="0" y="0"/>
+          <a:chExt cx="0" cy="0"/>
+        </a:xfrm>
+      </p:grpSpPr>
+      <p:sp>
+        <p:nvSpPr>
+          <p:cNvPr id="2" name="Title 1">
+            <a:extLst>
+              <a:ext uri="{FF2B5EF4-FFF2-40B4-BE49-F238E27FC236}">
+                <a16:creationId xmlns:a16="http://schemas.microsoft.com/office/drawing/2014/main" id="{38E06087-BB20-47B8-8D41-87F10D33336C}"/>
+              </a:ext>
+            </a:extLst>
+          </p:cNvPr>
+          <p:cNvSpPr>
+            <a:spLocks noGrp="1"/>
+          </p:cNvSpPr>
+          <p:nvPr>
+            <p:ph type="title"/>
+          </p:nvPr>
+        </p:nvSpPr>
+        <p:spPr/>
+        <p:txBody>
+          <a:bodyPr/>
+          <a:lstStyle/>
+          <a:p>
+            <a:r>
+              <a:rPr lang="en-US" dirty="0"/>
+              <a:t>Demo </a:t>
+            </a:r>
+          </a:p>
+        </p:txBody>
+      </p:sp>
+      <p:sp>
+        <p:nvSpPr>
+          <p:cNvPr id="3" name="Content Placeholder 2">
+            <a:extLst>
+              <a:ext uri="{FF2B5EF4-FFF2-40B4-BE49-F238E27FC236}">
+                <a16:creationId xmlns:a16="http://schemas.microsoft.com/office/drawing/2014/main" id="{F49B7B54-8559-4DAA-B16B-801B46E803AD}"/>
+              </a:ext>
+            </a:extLst>
+          </p:cNvPr>
+          <p:cNvSpPr>
+            <a:spLocks noGrp="1"/>
+          </p:cNvSpPr>
+          <p:nvPr>
+            <p:ph idx="1"/>
+          </p:nvPr>
+        </p:nvSpPr>
+        <p:spPr/>
+        <p:txBody>
+          <a:bodyPr/>
+          <a:lstStyle/>
+          <a:p>
+            <a:r>
+              <a:rPr lang="en-US" dirty="0"/>
+              <a:t>Focus on functions with minimum styles and layout</a:t>
+            </a:r>
+          </a:p>
+          <a:p>
+            <a:r>
+              <a:rPr lang="en-US" dirty="0"/>
+              <a:t>View models for application in a list</a:t>
+            </a:r>
+          </a:p>
+          <a:p>
+            <a:r>
+              <a:rPr lang="en-US" dirty="0"/>
+              <a:t>Pull the list of view models from backend</a:t>
+            </a:r>
+          </a:p>
+          <a:p>
+            <a:r>
+              <a:rPr lang="en-US" dirty="0"/>
+              <a:t>Demonstrate the functions of Add, Delete, View and Edit</a:t>
+            </a:r>
+          </a:p>
+          <a:p>
+            <a:r>
+              <a:rPr lang="en-US" dirty="0"/>
+              <a:t>A Sprint boot backend is developed to work with it</a:t>
+            </a:r>
+          </a:p>
+          <a:p>
+            <a:endParaRPr lang="en-US" dirty="0"/>
+          </a:p>
+        </p:txBody>
+      </p:sp>
+    </p:spTree>
+    <p:extLst>
+      <p:ext uri="{BB962C8B-B14F-4D97-AF65-F5344CB8AC3E}">
+        <p14:creationId xmlns:p14="http://schemas.microsoft.com/office/powerpoint/2010/main" val="3553257794"/>
+      </p:ext>
+    </p:extLst>
+  </p:cSld>
+  <p:clrMapOvr>
+    <a:masterClrMapping/>
+  </p:clrMapOvr>
+</p:sld>
+</file>
+
 <file path=ppt/theme/theme1.xml><?xml version="1.0" encoding="utf-8"?>
 <a:theme xmlns:a="http://schemas.openxmlformats.org/drawingml/2006/main" name="Office Theme">
   <a:themeElements>

</xml_diff>